<commit_message>
Remove default author from files created through "New File" button.
</commit_message>
<xml_diff>
--- a/app/WebContent/WEB-INF/modules-resources/rm/newFile/NewFile.pptx
+++ b/app/WebContent/WEB-INF/modules-resources/rm/newFile/NewFile.pptx
@@ -244,15 +244,17 @@
       </p:sp>
       <p:sp>
         <p:nvSpPr>
-          <p:cNvPr id="4" name="Date Placeholder 3"/>
-          <p:cNvSpPr>
-            <a:spLocks noGrp="1"/>
+          <p:cNvPr id="4" name="Rectangle 4"/>
+          <p:cNvSpPr>
+            <a:spLocks noGrp="1" noChangeArrowheads="1"/>
           </p:cNvSpPr>
           <p:nvPr>
             <p:ph type="dt" sz="half" idx="10"/>
           </p:nvPr>
         </p:nvSpPr>
-        <p:spPr/>
+        <p:spPr>
+          <a:ln/>
+        </p:spPr>
         <p:txBody>
           <a:bodyPr/>
           <a:lstStyle>
@@ -261,21 +263,26 @@
             </a:lvl1pPr>
           </a:lstStyle>
           <a:p>
+            <a:pPr>
+              <a:defRPr/>
+            </a:pPr>
             <a:endParaRPr lang="fr-CA"/>
           </a:p>
         </p:txBody>
       </p:sp>
       <p:sp>
         <p:nvSpPr>
-          <p:cNvPr id="5" name="Footer Placeholder 4"/>
-          <p:cNvSpPr>
-            <a:spLocks noGrp="1"/>
+          <p:cNvPr id="5" name="Rectangle 5"/>
+          <p:cNvSpPr>
+            <a:spLocks noGrp="1" noChangeArrowheads="1"/>
           </p:cNvSpPr>
           <p:nvPr>
             <p:ph type="ftr" sz="quarter" idx="11"/>
           </p:nvPr>
         </p:nvSpPr>
-        <p:spPr/>
+        <p:spPr>
+          <a:ln/>
+        </p:spPr>
         <p:txBody>
           <a:bodyPr/>
           <a:lstStyle>
@@ -284,21 +291,26 @@
             </a:lvl1pPr>
           </a:lstStyle>
           <a:p>
+            <a:pPr>
+              <a:defRPr/>
+            </a:pPr>
             <a:endParaRPr lang="fr-CA"/>
           </a:p>
         </p:txBody>
       </p:sp>
       <p:sp>
         <p:nvSpPr>
-          <p:cNvPr id="6" name="Slide Number Placeholder 5"/>
-          <p:cNvSpPr>
-            <a:spLocks noGrp="1"/>
+          <p:cNvPr id="6" name="Rectangle 6"/>
+          <p:cNvSpPr>
+            <a:spLocks noGrp="1" noChangeArrowheads="1"/>
           </p:cNvSpPr>
           <p:nvPr>
             <p:ph type="sldNum" sz="quarter" idx="12"/>
           </p:nvPr>
         </p:nvSpPr>
-        <p:spPr/>
+        <p:spPr>
+          <a:ln/>
+        </p:spPr>
         <p:txBody>
           <a:bodyPr/>
           <a:lstStyle>
@@ -307,9 +319,14 @@
             </a:lvl1pPr>
           </a:lstStyle>
           <a:p>
-            <a:fld id="{741DA321-5027-4A26-80F8-9A41E4D5643A}" type="slidenum">
+            <a:pPr>
+              <a:defRPr/>
+            </a:pPr>
+            <a:fld id="{7F3DEAA3-8419-47D7-B399-55C7AC986A43}" type="slidenum">
               <a:rPr lang="fr-CA"/>
-              <a:pPr/>
+              <a:pPr>
+                <a:defRPr/>
+              </a:pPr>
               <a:t>‹#›</a:t>
             </a:fld>
             <a:endParaRPr lang="fr-CA"/>
@@ -416,15 +433,17 @@
       </p:sp>
       <p:sp>
         <p:nvSpPr>
-          <p:cNvPr id="4" name="Date Placeholder 3"/>
-          <p:cNvSpPr>
-            <a:spLocks noGrp="1"/>
+          <p:cNvPr id="4" name="Rectangle 4"/>
+          <p:cNvSpPr>
+            <a:spLocks noGrp="1" noChangeArrowheads="1"/>
           </p:cNvSpPr>
           <p:nvPr>
             <p:ph type="dt" sz="half" idx="10"/>
           </p:nvPr>
         </p:nvSpPr>
-        <p:spPr/>
+        <p:spPr>
+          <a:ln/>
+        </p:spPr>
         <p:txBody>
           <a:bodyPr/>
           <a:lstStyle>
@@ -433,21 +452,26 @@
             </a:lvl1pPr>
           </a:lstStyle>
           <a:p>
+            <a:pPr>
+              <a:defRPr/>
+            </a:pPr>
             <a:endParaRPr lang="fr-CA"/>
           </a:p>
         </p:txBody>
       </p:sp>
       <p:sp>
         <p:nvSpPr>
-          <p:cNvPr id="5" name="Footer Placeholder 4"/>
-          <p:cNvSpPr>
-            <a:spLocks noGrp="1"/>
+          <p:cNvPr id="5" name="Rectangle 5"/>
+          <p:cNvSpPr>
+            <a:spLocks noGrp="1" noChangeArrowheads="1"/>
           </p:cNvSpPr>
           <p:nvPr>
             <p:ph type="ftr" sz="quarter" idx="11"/>
           </p:nvPr>
         </p:nvSpPr>
-        <p:spPr/>
+        <p:spPr>
+          <a:ln/>
+        </p:spPr>
         <p:txBody>
           <a:bodyPr/>
           <a:lstStyle>
@@ -456,21 +480,26 @@
             </a:lvl1pPr>
           </a:lstStyle>
           <a:p>
+            <a:pPr>
+              <a:defRPr/>
+            </a:pPr>
             <a:endParaRPr lang="fr-CA"/>
           </a:p>
         </p:txBody>
       </p:sp>
       <p:sp>
         <p:nvSpPr>
-          <p:cNvPr id="6" name="Slide Number Placeholder 5"/>
-          <p:cNvSpPr>
-            <a:spLocks noGrp="1"/>
+          <p:cNvPr id="6" name="Rectangle 6"/>
+          <p:cNvSpPr>
+            <a:spLocks noGrp="1" noChangeArrowheads="1"/>
           </p:cNvSpPr>
           <p:nvPr>
             <p:ph type="sldNum" sz="quarter" idx="12"/>
           </p:nvPr>
         </p:nvSpPr>
-        <p:spPr/>
+        <p:spPr>
+          <a:ln/>
+        </p:spPr>
         <p:txBody>
           <a:bodyPr/>
           <a:lstStyle>
@@ -479,9 +508,14 @@
             </a:lvl1pPr>
           </a:lstStyle>
           <a:p>
-            <a:fld id="{A4DA4904-FAEE-4BD2-ADF8-A84B655D83BD}" type="slidenum">
+            <a:pPr>
+              <a:defRPr/>
+            </a:pPr>
+            <a:fld id="{E08AB2C3-169B-4C3D-BF08-18AFB430A1C9}" type="slidenum">
               <a:rPr lang="fr-CA"/>
-              <a:pPr/>
+              <a:pPr>
+                <a:defRPr/>
+              </a:pPr>
               <a:t>‹#›</a:t>
             </a:fld>
             <a:endParaRPr lang="fr-CA"/>
@@ -598,15 +632,17 @@
       </p:sp>
       <p:sp>
         <p:nvSpPr>
-          <p:cNvPr id="4" name="Date Placeholder 3"/>
-          <p:cNvSpPr>
-            <a:spLocks noGrp="1"/>
+          <p:cNvPr id="4" name="Rectangle 4"/>
+          <p:cNvSpPr>
+            <a:spLocks noGrp="1" noChangeArrowheads="1"/>
           </p:cNvSpPr>
           <p:nvPr>
             <p:ph type="dt" sz="half" idx="10"/>
           </p:nvPr>
         </p:nvSpPr>
-        <p:spPr/>
+        <p:spPr>
+          <a:ln/>
+        </p:spPr>
         <p:txBody>
           <a:bodyPr/>
           <a:lstStyle>
@@ -615,21 +651,26 @@
             </a:lvl1pPr>
           </a:lstStyle>
           <a:p>
+            <a:pPr>
+              <a:defRPr/>
+            </a:pPr>
             <a:endParaRPr lang="fr-CA"/>
           </a:p>
         </p:txBody>
       </p:sp>
       <p:sp>
         <p:nvSpPr>
-          <p:cNvPr id="5" name="Footer Placeholder 4"/>
-          <p:cNvSpPr>
-            <a:spLocks noGrp="1"/>
+          <p:cNvPr id="5" name="Rectangle 5"/>
+          <p:cNvSpPr>
+            <a:spLocks noGrp="1" noChangeArrowheads="1"/>
           </p:cNvSpPr>
           <p:nvPr>
             <p:ph type="ftr" sz="quarter" idx="11"/>
           </p:nvPr>
         </p:nvSpPr>
-        <p:spPr/>
+        <p:spPr>
+          <a:ln/>
+        </p:spPr>
         <p:txBody>
           <a:bodyPr/>
           <a:lstStyle>
@@ -638,21 +679,26 @@
             </a:lvl1pPr>
           </a:lstStyle>
           <a:p>
+            <a:pPr>
+              <a:defRPr/>
+            </a:pPr>
             <a:endParaRPr lang="fr-CA"/>
           </a:p>
         </p:txBody>
       </p:sp>
       <p:sp>
         <p:nvSpPr>
-          <p:cNvPr id="6" name="Slide Number Placeholder 5"/>
-          <p:cNvSpPr>
-            <a:spLocks noGrp="1"/>
+          <p:cNvPr id="6" name="Rectangle 6"/>
+          <p:cNvSpPr>
+            <a:spLocks noGrp="1" noChangeArrowheads="1"/>
           </p:cNvSpPr>
           <p:nvPr>
             <p:ph type="sldNum" sz="quarter" idx="12"/>
           </p:nvPr>
         </p:nvSpPr>
-        <p:spPr/>
+        <p:spPr>
+          <a:ln/>
+        </p:spPr>
         <p:txBody>
           <a:bodyPr/>
           <a:lstStyle>
@@ -661,9 +707,14 @@
             </a:lvl1pPr>
           </a:lstStyle>
           <a:p>
-            <a:fld id="{CE63531F-132A-42E5-B296-10B3B9B5A741}" type="slidenum">
+            <a:pPr>
+              <a:defRPr/>
+            </a:pPr>
+            <a:fld id="{476D90B9-CC3B-460C-B57F-1BC10A83E44C}" type="slidenum">
               <a:rPr lang="fr-CA"/>
-              <a:pPr/>
+              <a:pPr>
+                <a:defRPr/>
+              </a:pPr>
               <a:t>‹#›</a:t>
             </a:fld>
             <a:endParaRPr lang="fr-CA"/>
@@ -770,15 +821,17 @@
       </p:sp>
       <p:sp>
         <p:nvSpPr>
-          <p:cNvPr id="4" name="Date Placeholder 3"/>
-          <p:cNvSpPr>
-            <a:spLocks noGrp="1"/>
+          <p:cNvPr id="4" name="Rectangle 4"/>
+          <p:cNvSpPr>
+            <a:spLocks noGrp="1" noChangeArrowheads="1"/>
           </p:cNvSpPr>
           <p:nvPr>
             <p:ph type="dt" sz="half" idx="10"/>
           </p:nvPr>
         </p:nvSpPr>
-        <p:spPr/>
+        <p:spPr>
+          <a:ln/>
+        </p:spPr>
         <p:txBody>
           <a:bodyPr/>
           <a:lstStyle>
@@ -787,21 +840,26 @@
             </a:lvl1pPr>
           </a:lstStyle>
           <a:p>
+            <a:pPr>
+              <a:defRPr/>
+            </a:pPr>
             <a:endParaRPr lang="fr-CA"/>
           </a:p>
         </p:txBody>
       </p:sp>
       <p:sp>
         <p:nvSpPr>
-          <p:cNvPr id="5" name="Footer Placeholder 4"/>
-          <p:cNvSpPr>
-            <a:spLocks noGrp="1"/>
+          <p:cNvPr id="5" name="Rectangle 5"/>
+          <p:cNvSpPr>
+            <a:spLocks noGrp="1" noChangeArrowheads="1"/>
           </p:cNvSpPr>
           <p:nvPr>
             <p:ph type="ftr" sz="quarter" idx="11"/>
           </p:nvPr>
         </p:nvSpPr>
-        <p:spPr/>
+        <p:spPr>
+          <a:ln/>
+        </p:spPr>
         <p:txBody>
           <a:bodyPr/>
           <a:lstStyle>
@@ -810,21 +868,26 @@
             </a:lvl1pPr>
           </a:lstStyle>
           <a:p>
+            <a:pPr>
+              <a:defRPr/>
+            </a:pPr>
             <a:endParaRPr lang="fr-CA"/>
           </a:p>
         </p:txBody>
       </p:sp>
       <p:sp>
         <p:nvSpPr>
-          <p:cNvPr id="6" name="Slide Number Placeholder 5"/>
-          <p:cNvSpPr>
-            <a:spLocks noGrp="1"/>
+          <p:cNvPr id="6" name="Rectangle 6"/>
+          <p:cNvSpPr>
+            <a:spLocks noGrp="1" noChangeArrowheads="1"/>
           </p:cNvSpPr>
           <p:nvPr>
             <p:ph type="sldNum" sz="quarter" idx="12"/>
           </p:nvPr>
         </p:nvSpPr>
-        <p:spPr/>
+        <p:spPr>
+          <a:ln/>
+        </p:spPr>
         <p:txBody>
           <a:bodyPr/>
           <a:lstStyle>
@@ -833,9 +896,14 @@
             </a:lvl1pPr>
           </a:lstStyle>
           <a:p>
-            <a:fld id="{789B748C-9B50-4E86-AD94-ADD1395ED13D}" type="slidenum">
+            <a:pPr>
+              <a:defRPr/>
+            </a:pPr>
+            <a:fld id="{761918FD-DA28-4514-AED2-391E48201BBA}" type="slidenum">
               <a:rPr lang="fr-CA"/>
-              <a:pPr/>
+              <a:pPr>
+                <a:defRPr/>
+              </a:pPr>
               <a:t>‹#›</a:t>
             </a:fld>
             <a:endParaRPr lang="fr-CA"/>
@@ -965,15 +1033,17 @@
       </p:sp>
       <p:sp>
         <p:nvSpPr>
-          <p:cNvPr id="4" name="Date Placeholder 3"/>
-          <p:cNvSpPr>
-            <a:spLocks noGrp="1"/>
+          <p:cNvPr id="4" name="Rectangle 4"/>
+          <p:cNvSpPr>
+            <a:spLocks noGrp="1" noChangeArrowheads="1"/>
           </p:cNvSpPr>
           <p:nvPr>
             <p:ph type="dt" sz="half" idx="10"/>
           </p:nvPr>
         </p:nvSpPr>
-        <p:spPr/>
+        <p:spPr>
+          <a:ln/>
+        </p:spPr>
         <p:txBody>
           <a:bodyPr/>
           <a:lstStyle>
@@ -982,21 +1052,26 @@
             </a:lvl1pPr>
           </a:lstStyle>
           <a:p>
+            <a:pPr>
+              <a:defRPr/>
+            </a:pPr>
             <a:endParaRPr lang="fr-CA"/>
           </a:p>
         </p:txBody>
       </p:sp>
       <p:sp>
         <p:nvSpPr>
-          <p:cNvPr id="5" name="Footer Placeholder 4"/>
-          <p:cNvSpPr>
-            <a:spLocks noGrp="1"/>
+          <p:cNvPr id="5" name="Rectangle 5"/>
+          <p:cNvSpPr>
+            <a:spLocks noGrp="1" noChangeArrowheads="1"/>
           </p:cNvSpPr>
           <p:nvPr>
             <p:ph type="ftr" sz="quarter" idx="11"/>
           </p:nvPr>
         </p:nvSpPr>
-        <p:spPr/>
+        <p:spPr>
+          <a:ln/>
+        </p:spPr>
         <p:txBody>
           <a:bodyPr/>
           <a:lstStyle>
@@ -1005,21 +1080,26 @@
             </a:lvl1pPr>
           </a:lstStyle>
           <a:p>
+            <a:pPr>
+              <a:defRPr/>
+            </a:pPr>
             <a:endParaRPr lang="fr-CA"/>
           </a:p>
         </p:txBody>
       </p:sp>
       <p:sp>
         <p:nvSpPr>
-          <p:cNvPr id="6" name="Slide Number Placeholder 5"/>
-          <p:cNvSpPr>
-            <a:spLocks noGrp="1"/>
+          <p:cNvPr id="6" name="Rectangle 6"/>
+          <p:cNvSpPr>
+            <a:spLocks noGrp="1" noChangeArrowheads="1"/>
           </p:cNvSpPr>
           <p:nvPr>
             <p:ph type="sldNum" sz="quarter" idx="12"/>
           </p:nvPr>
         </p:nvSpPr>
-        <p:spPr/>
+        <p:spPr>
+          <a:ln/>
+        </p:spPr>
         <p:txBody>
           <a:bodyPr/>
           <a:lstStyle>
@@ -1028,9 +1108,14 @@
             </a:lvl1pPr>
           </a:lstStyle>
           <a:p>
-            <a:fld id="{E23AB1B1-D7A3-48EA-946A-271F15B3EDCB}" type="slidenum">
+            <a:pPr>
+              <a:defRPr/>
+            </a:pPr>
+            <a:fld id="{19F5B7AF-DD15-462E-8B91-526CEABE4B97}" type="slidenum">
               <a:rPr lang="fr-CA"/>
-              <a:pPr/>
+              <a:pPr>
+                <a:defRPr/>
+              </a:pPr>
               <a:t>‹#›</a:t>
             </a:fld>
             <a:endParaRPr lang="fr-CA"/>
@@ -1254,15 +1339,17 @@
       </p:sp>
       <p:sp>
         <p:nvSpPr>
-          <p:cNvPr id="5" name="Date Placeholder 4"/>
-          <p:cNvSpPr>
-            <a:spLocks noGrp="1"/>
+          <p:cNvPr id="5" name="Rectangle 4"/>
+          <p:cNvSpPr>
+            <a:spLocks noGrp="1" noChangeArrowheads="1"/>
           </p:cNvSpPr>
           <p:nvPr>
             <p:ph type="dt" sz="half" idx="10"/>
           </p:nvPr>
         </p:nvSpPr>
-        <p:spPr/>
+        <p:spPr>
+          <a:ln/>
+        </p:spPr>
         <p:txBody>
           <a:bodyPr/>
           <a:lstStyle>
@@ -1271,21 +1358,26 @@
             </a:lvl1pPr>
           </a:lstStyle>
           <a:p>
+            <a:pPr>
+              <a:defRPr/>
+            </a:pPr>
             <a:endParaRPr lang="fr-CA"/>
           </a:p>
         </p:txBody>
       </p:sp>
       <p:sp>
         <p:nvSpPr>
-          <p:cNvPr id="6" name="Footer Placeholder 5"/>
-          <p:cNvSpPr>
-            <a:spLocks noGrp="1"/>
+          <p:cNvPr id="6" name="Rectangle 5"/>
+          <p:cNvSpPr>
+            <a:spLocks noGrp="1" noChangeArrowheads="1"/>
           </p:cNvSpPr>
           <p:nvPr>
             <p:ph type="ftr" sz="quarter" idx="11"/>
           </p:nvPr>
         </p:nvSpPr>
-        <p:spPr/>
+        <p:spPr>
+          <a:ln/>
+        </p:spPr>
         <p:txBody>
           <a:bodyPr/>
           <a:lstStyle>
@@ -1294,21 +1386,26 @@
             </a:lvl1pPr>
           </a:lstStyle>
           <a:p>
+            <a:pPr>
+              <a:defRPr/>
+            </a:pPr>
             <a:endParaRPr lang="fr-CA"/>
           </a:p>
         </p:txBody>
       </p:sp>
       <p:sp>
         <p:nvSpPr>
-          <p:cNvPr id="7" name="Slide Number Placeholder 6"/>
-          <p:cNvSpPr>
-            <a:spLocks noGrp="1"/>
+          <p:cNvPr id="7" name="Rectangle 6"/>
+          <p:cNvSpPr>
+            <a:spLocks noGrp="1" noChangeArrowheads="1"/>
           </p:cNvSpPr>
           <p:nvPr>
             <p:ph type="sldNum" sz="quarter" idx="12"/>
           </p:nvPr>
         </p:nvSpPr>
-        <p:spPr/>
+        <p:spPr>
+          <a:ln/>
+        </p:spPr>
         <p:txBody>
           <a:bodyPr/>
           <a:lstStyle>
@@ -1317,9 +1414,14 @@
             </a:lvl1pPr>
           </a:lstStyle>
           <a:p>
-            <a:fld id="{C03C5906-F6E9-49C6-AFA6-8E28CB649F96}" type="slidenum">
+            <a:pPr>
+              <a:defRPr/>
+            </a:pPr>
+            <a:fld id="{75F6755C-55FA-4042-A288-A01164A125A1}" type="slidenum">
               <a:rPr lang="fr-CA"/>
-              <a:pPr/>
+              <a:pPr>
+                <a:defRPr/>
+              </a:pPr>
               <a:t>‹#›</a:t>
             </a:fld>
             <a:endParaRPr lang="fr-CA"/>
@@ -1677,15 +1779,17 @@
       </p:sp>
       <p:sp>
         <p:nvSpPr>
-          <p:cNvPr id="7" name="Date Placeholder 6"/>
-          <p:cNvSpPr>
-            <a:spLocks noGrp="1"/>
+          <p:cNvPr id="7" name="Rectangle 4"/>
+          <p:cNvSpPr>
+            <a:spLocks noGrp="1" noChangeArrowheads="1"/>
           </p:cNvSpPr>
           <p:nvPr>
             <p:ph type="dt" sz="half" idx="10"/>
           </p:nvPr>
         </p:nvSpPr>
-        <p:spPr/>
+        <p:spPr>
+          <a:ln/>
+        </p:spPr>
         <p:txBody>
           <a:bodyPr/>
           <a:lstStyle>
@@ -1694,21 +1798,26 @@
             </a:lvl1pPr>
           </a:lstStyle>
           <a:p>
+            <a:pPr>
+              <a:defRPr/>
+            </a:pPr>
             <a:endParaRPr lang="fr-CA"/>
           </a:p>
         </p:txBody>
       </p:sp>
       <p:sp>
         <p:nvSpPr>
-          <p:cNvPr id="8" name="Footer Placeholder 7"/>
-          <p:cNvSpPr>
-            <a:spLocks noGrp="1"/>
+          <p:cNvPr id="8" name="Rectangle 5"/>
+          <p:cNvSpPr>
+            <a:spLocks noGrp="1" noChangeArrowheads="1"/>
           </p:cNvSpPr>
           <p:nvPr>
             <p:ph type="ftr" sz="quarter" idx="11"/>
           </p:nvPr>
         </p:nvSpPr>
-        <p:spPr/>
+        <p:spPr>
+          <a:ln/>
+        </p:spPr>
         <p:txBody>
           <a:bodyPr/>
           <a:lstStyle>
@@ -1717,21 +1826,26 @@
             </a:lvl1pPr>
           </a:lstStyle>
           <a:p>
+            <a:pPr>
+              <a:defRPr/>
+            </a:pPr>
             <a:endParaRPr lang="fr-CA"/>
           </a:p>
         </p:txBody>
       </p:sp>
       <p:sp>
         <p:nvSpPr>
-          <p:cNvPr id="9" name="Slide Number Placeholder 8"/>
-          <p:cNvSpPr>
-            <a:spLocks noGrp="1"/>
+          <p:cNvPr id="9" name="Rectangle 6"/>
+          <p:cNvSpPr>
+            <a:spLocks noGrp="1" noChangeArrowheads="1"/>
           </p:cNvSpPr>
           <p:nvPr>
             <p:ph type="sldNum" sz="quarter" idx="12"/>
           </p:nvPr>
         </p:nvSpPr>
-        <p:spPr/>
+        <p:spPr>
+          <a:ln/>
+        </p:spPr>
         <p:txBody>
           <a:bodyPr/>
           <a:lstStyle>
@@ -1740,9 +1854,14 @@
             </a:lvl1pPr>
           </a:lstStyle>
           <a:p>
-            <a:fld id="{AB05996E-065A-420C-9AE1-82BE3F4124F0}" type="slidenum">
+            <a:pPr>
+              <a:defRPr/>
+            </a:pPr>
+            <a:fld id="{C2F6A6DB-B2B4-43BE-A1CB-2B716CD3F524}" type="slidenum">
               <a:rPr lang="fr-CA"/>
-              <a:pPr/>
+              <a:pPr>
+                <a:defRPr/>
+              </a:pPr>
               <a:t>‹#›</a:t>
             </a:fld>
             <a:endParaRPr lang="fr-CA"/>
@@ -1798,15 +1917,17 @@
       </p:sp>
       <p:sp>
         <p:nvSpPr>
-          <p:cNvPr id="3" name="Date Placeholder 2"/>
-          <p:cNvSpPr>
-            <a:spLocks noGrp="1"/>
+          <p:cNvPr id="3" name="Rectangle 4"/>
+          <p:cNvSpPr>
+            <a:spLocks noGrp="1" noChangeArrowheads="1"/>
           </p:cNvSpPr>
           <p:nvPr>
             <p:ph type="dt" sz="half" idx="10"/>
           </p:nvPr>
         </p:nvSpPr>
-        <p:spPr/>
+        <p:spPr>
+          <a:ln/>
+        </p:spPr>
         <p:txBody>
           <a:bodyPr/>
           <a:lstStyle>
@@ -1815,21 +1936,26 @@
             </a:lvl1pPr>
           </a:lstStyle>
           <a:p>
+            <a:pPr>
+              <a:defRPr/>
+            </a:pPr>
             <a:endParaRPr lang="fr-CA"/>
           </a:p>
         </p:txBody>
       </p:sp>
       <p:sp>
         <p:nvSpPr>
-          <p:cNvPr id="4" name="Footer Placeholder 3"/>
-          <p:cNvSpPr>
-            <a:spLocks noGrp="1"/>
+          <p:cNvPr id="4" name="Rectangle 5"/>
+          <p:cNvSpPr>
+            <a:spLocks noGrp="1" noChangeArrowheads="1"/>
           </p:cNvSpPr>
           <p:nvPr>
             <p:ph type="ftr" sz="quarter" idx="11"/>
           </p:nvPr>
         </p:nvSpPr>
-        <p:spPr/>
+        <p:spPr>
+          <a:ln/>
+        </p:spPr>
         <p:txBody>
           <a:bodyPr/>
           <a:lstStyle>
@@ -1838,21 +1964,26 @@
             </a:lvl1pPr>
           </a:lstStyle>
           <a:p>
+            <a:pPr>
+              <a:defRPr/>
+            </a:pPr>
             <a:endParaRPr lang="fr-CA"/>
           </a:p>
         </p:txBody>
       </p:sp>
       <p:sp>
         <p:nvSpPr>
-          <p:cNvPr id="5" name="Slide Number Placeholder 4"/>
-          <p:cNvSpPr>
-            <a:spLocks noGrp="1"/>
+          <p:cNvPr id="5" name="Rectangle 6"/>
+          <p:cNvSpPr>
+            <a:spLocks noGrp="1" noChangeArrowheads="1"/>
           </p:cNvSpPr>
           <p:nvPr>
             <p:ph type="sldNum" sz="quarter" idx="12"/>
           </p:nvPr>
         </p:nvSpPr>
-        <p:spPr/>
+        <p:spPr>
+          <a:ln/>
+        </p:spPr>
         <p:txBody>
           <a:bodyPr/>
           <a:lstStyle>
@@ -1861,9 +1992,14 @@
             </a:lvl1pPr>
           </a:lstStyle>
           <a:p>
-            <a:fld id="{040460BB-5A60-4207-AA10-999B8A04B4A2}" type="slidenum">
+            <a:pPr>
+              <a:defRPr/>
+            </a:pPr>
+            <a:fld id="{8D79F5AE-1394-4B71-8937-88B480AA3E2B}" type="slidenum">
               <a:rPr lang="fr-CA"/>
-              <a:pPr/>
+              <a:pPr>
+                <a:defRPr/>
+              </a:pPr>
               <a:t>‹#›</a:t>
             </a:fld>
             <a:endParaRPr lang="fr-CA"/>
@@ -1897,15 +2033,17 @@
       </p:grpSpPr>
       <p:sp>
         <p:nvSpPr>
-          <p:cNvPr id="2" name="Date Placeholder 1"/>
-          <p:cNvSpPr>
-            <a:spLocks noGrp="1"/>
+          <p:cNvPr id="2" name="Rectangle 4"/>
+          <p:cNvSpPr>
+            <a:spLocks noGrp="1" noChangeArrowheads="1"/>
           </p:cNvSpPr>
           <p:nvPr>
             <p:ph type="dt" sz="half" idx="10"/>
           </p:nvPr>
         </p:nvSpPr>
-        <p:spPr/>
+        <p:spPr>
+          <a:ln/>
+        </p:spPr>
         <p:txBody>
           <a:bodyPr/>
           <a:lstStyle>
@@ -1914,21 +2052,26 @@
             </a:lvl1pPr>
           </a:lstStyle>
           <a:p>
+            <a:pPr>
+              <a:defRPr/>
+            </a:pPr>
             <a:endParaRPr lang="fr-CA"/>
           </a:p>
         </p:txBody>
       </p:sp>
       <p:sp>
         <p:nvSpPr>
-          <p:cNvPr id="3" name="Footer Placeholder 2"/>
-          <p:cNvSpPr>
-            <a:spLocks noGrp="1"/>
+          <p:cNvPr id="3" name="Rectangle 5"/>
+          <p:cNvSpPr>
+            <a:spLocks noGrp="1" noChangeArrowheads="1"/>
           </p:cNvSpPr>
           <p:nvPr>
             <p:ph type="ftr" sz="quarter" idx="11"/>
           </p:nvPr>
         </p:nvSpPr>
-        <p:spPr/>
+        <p:spPr>
+          <a:ln/>
+        </p:spPr>
         <p:txBody>
           <a:bodyPr/>
           <a:lstStyle>
@@ -1937,21 +2080,26 @@
             </a:lvl1pPr>
           </a:lstStyle>
           <a:p>
+            <a:pPr>
+              <a:defRPr/>
+            </a:pPr>
             <a:endParaRPr lang="fr-CA"/>
           </a:p>
         </p:txBody>
       </p:sp>
       <p:sp>
         <p:nvSpPr>
-          <p:cNvPr id="4" name="Slide Number Placeholder 3"/>
-          <p:cNvSpPr>
-            <a:spLocks noGrp="1"/>
+          <p:cNvPr id="4" name="Rectangle 6"/>
+          <p:cNvSpPr>
+            <a:spLocks noGrp="1" noChangeArrowheads="1"/>
           </p:cNvSpPr>
           <p:nvPr>
             <p:ph type="sldNum" sz="quarter" idx="12"/>
           </p:nvPr>
         </p:nvSpPr>
-        <p:spPr/>
+        <p:spPr>
+          <a:ln/>
+        </p:spPr>
         <p:txBody>
           <a:bodyPr/>
           <a:lstStyle>
@@ -1960,9 +2108,14 @@
             </a:lvl1pPr>
           </a:lstStyle>
           <a:p>
-            <a:fld id="{DA64CC53-205D-4A37-8715-79B7AE83C1DF}" type="slidenum">
+            <a:pPr>
+              <a:defRPr/>
+            </a:pPr>
+            <a:fld id="{27702BAF-6CAA-4AFC-8AA9-59585BDFD2C7}" type="slidenum">
               <a:rPr lang="fr-CA"/>
-              <a:pPr/>
+              <a:pPr>
+                <a:defRPr/>
+              </a:pPr>
               <a:t>‹#›</a:t>
             </a:fld>
             <a:endParaRPr lang="fr-CA"/>
@@ -2176,15 +2329,17 @@
       </p:sp>
       <p:sp>
         <p:nvSpPr>
-          <p:cNvPr id="5" name="Date Placeholder 4"/>
-          <p:cNvSpPr>
-            <a:spLocks noGrp="1"/>
+          <p:cNvPr id="5" name="Rectangle 4"/>
+          <p:cNvSpPr>
+            <a:spLocks noGrp="1" noChangeArrowheads="1"/>
           </p:cNvSpPr>
           <p:nvPr>
             <p:ph type="dt" sz="half" idx="10"/>
           </p:nvPr>
         </p:nvSpPr>
-        <p:spPr/>
+        <p:spPr>
+          <a:ln/>
+        </p:spPr>
         <p:txBody>
           <a:bodyPr/>
           <a:lstStyle>
@@ -2193,21 +2348,26 @@
             </a:lvl1pPr>
           </a:lstStyle>
           <a:p>
+            <a:pPr>
+              <a:defRPr/>
+            </a:pPr>
             <a:endParaRPr lang="fr-CA"/>
           </a:p>
         </p:txBody>
       </p:sp>
       <p:sp>
         <p:nvSpPr>
-          <p:cNvPr id="6" name="Footer Placeholder 5"/>
-          <p:cNvSpPr>
-            <a:spLocks noGrp="1"/>
+          <p:cNvPr id="6" name="Rectangle 5"/>
+          <p:cNvSpPr>
+            <a:spLocks noGrp="1" noChangeArrowheads="1"/>
           </p:cNvSpPr>
           <p:nvPr>
             <p:ph type="ftr" sz="quarter" idx="11"/>
           </p:nvPr>
         </p:nvSpPr>
-        <p:spPr/>
+        <p:spPr>
+          <a:ln/>
+        </p:spPr>
         <p:txBody>
           <a:bodyPr/>
           <a:lstStyle>
@@ -2216,21 +2376,26 @@
             </a:lvl1pPr>
           </a:lstStyle>
           <a:p>
+            <a:pPr>
+              <a:defRPr/>
+            </a:pPr>
             <a:endParaRPr lang="fr-CA"/>
           </a:p>
         </p:txBody>
       </p:sp>
       <p:sp>
         <p:nvSpPr>
-          <p:cNvPr id="7" name="Slide Number Placeholder 6"/>
-          <p:cNvSpPr>
-            <a:spLocks noGrp="1"/>
+          <p:cNvPr id="7" name="Rectangle 6"/>
+          <p:cNvSpPr>
+            <a:spLocks noGrp="1" noChangeArrowheads="1"/>
           </p:cNvSpPr>
           <p:nvPr>
             <p:ph type="sldNum" sz="quarter" idx="12"/>
           </p:nvPr>
         </p:nvSpPr>
-        <p:spPr/>
+        <p:spPr>
+          <a:ln/>
+        </p:spPr>
         <p:txBody>
           <a:bodyPr/>
           <a:lstStyle>
@@ -2239,9 +2404,14 @@
             </a:lvl1pPr>
           </a:lstStyle>
           <a:p>
-            <a:fld id="{2D0C99B5-BD55-4E48-AC3B-D3CF2E190E7F}" type="slidenum">
+            <a:pPr>
+              <a:defRPr/>
+            </a:pPr>
+            <a:fld id="{F23B3FCC-19AD-40C8-94D6-EB6B56376AD4}" type="slidenum">
               <a:rPr lang="fr-CA"/>
-              <a:pPr/>
+              <a:pPr>
+                <a:defRPr/>
+              </a:pPr>
               <a:t>‹#›</a:t>
             </a:fld>
             <a:endParaRPr lang="fr-CA"/>
@@ -2361,7 +2531,8 @@
             </a:lvl9pPr>
           </a:lstStyle>
           <a:p>
-            <a:endParaRPr lang="en-US"/>
+            <a:pPr lvl="0"/>
+            <a:endParaRPr lang="en-US" noProof="0"/>
           </a:p>
         </p:txBody>
       </p:sp>
@@ -2432,15 +2603,17 @@
       </p:sp>
       <p:sp>
         <p:nvSpPr>
-          <p:cNvPr id="5" name="Date Placeholder 4"/>
-          <p:cNvSpPr>
-            <a:spLocks noGrp="1"/>
+          <p:cNvPr id="5" name="Rectangle 4"/>
+          <p:cNvSpPr>
+            <a:spLocks noGrp="1" noChangeArrowheads="1"/>
           </p:cNvSpPr>
           <p:nvPr>
             <p:ph type="dt" sz="half" idx="10"/>
           </p:nvPr>
         </p:nvSpPr>
-        <p:spPr/>
+        <p:spPr>
+          <a:ln/>
+        </p:spPr>
         <p:txBody>
           <a:bodyPr/>
           <a:lstStyle>
@@ -2449,21 +2622,26 @@
             </a:lvl1pPr>
           </a:lstStyle>
           <a:p>
+            <a:pPr>
+              <a:defRPr/>
+            </a:pPr>
             <a:endParaRPr lang="fr-CA"/>
           </a:p>
         </p:txBody>
       </p:sp>
       <p:sp>
         <p:nvSpPr>
-          <p:cNvPr id="6" name="Footer Placeholder 5"/>
-          <p:cNvSpPr>
-            <a:spLocks noGrp="1"/>
+          <p:cNvPr id="6" name="Rectangle 5"/>
+          <p:cNvSpPr>
+            <a:spLocks noGrp="1" noChangeArrowheads="1"/>
           </p:cNvSpPr>
           <p:nvPr>
             <p:ph type="ftr" sz="quarter" idx="11"/>
           </p:nvPr>
         </p:nvSpPr>
-        <p:spPr/>
+        <p:spPr>
+          <a:ln/>
+        </p:spPr>
         <p:txBody>
           <a:bodyPr/>
           <a:lstStyle>
@@ -2472,21 +2650,26 @@
             </a:lvl1pPr>
           </a:lstStyle>
           <a:p>
+            <a:pPr>
+              <a:defRPr/>
+            </a:pPr>
             <a:endParaRPr lang="fr-CA"/>
           </a:p>
         </p:txBody>
       </p:sp>
       <p:sp>
         <p:nvSpPr>
-          <p:cNvPr id="7" name="Slide Number Placeholder 6"/>
-          <p:cNvSpPr>
-            <a:spLocks noGrp="1"/>
+          <p:cNvPr id="7" name="Rectangle 6"/>
+          <p:cNvSpPr>
+            <a:spLocks noGrp="1" noChangeArrowheads="1"/>
           </p:cNvSpPr>
           <p:nvPr>
             <p:ph type="sldNum" sz="quarter" idx="12"/>
           </p:nvPr>
         </p:nvSpPr>
-        <p:spPr/>
+        <p:spPr>
+          <a:ln/>
+        </p:spPr>
         <p:txBody>
           <a:bodyPr/>
           <a:lstStyle>
@@ -2495,9 +2678,14 @@
             </a:lvl1pPr>
           </a:lstStyle>
           <a:p>
-            <a:fld id="{0319A363-E0A1-45C7-8231-1ED4A263902F}" type="slidenum">
+            <a:pPr>
+              <a:defRPr/>
+            </a:pPr>
+            <a:fld id="{1A02F187-098E-4C03-98A4-E9F4C3F32399}" type="slidenum">
               <a:rPr lang="fr-CA"/>
-              <a:pPr/>
+              <a:pPr>
+                <a:defRPr/>
+              </a:pPr>
               <a:t>‹#›</a:t>
             </a:fld>
             <a:endParaRPr lang="fr-CA"/>
@@ -2562,7 +2750,6 @@
             <a:headEnd/>
             <a:tailEnd/>
           </a:ln>
-          <a:effectLst/>
         </p:spPr>
         <p:txBody>
           <a:bodyPr vert="horz" wrap="square" lIns="91440" tIns="45720" rIns="91440" bIns="45720" numCol="1" anchor="ctr" anchorCtr="0" compatLnSpc="1">
@@ -2605,7 +2792,6 @@
             <a:headEnd/>
             <a:tailEnd/>
           </a:ln>
-          <a:effectLst/>
         </p:spPr>
         <p:txBody>
           <a:bodyPr vert="horz" wrap="square" lIns="91440" tIns="45720" rIns="91440" bIns="45720" numCol="1" anchor="t" anchorCtr="0" compatLnSpc="1">
@@ -2690,6 +2876,9 @@
             </a:lvl1pPr>
           </a:lstStyle>
           <a:p>
+            <a:pPr>
+              <a:defRPr/>
+            </a:pPr>
             <a:endParaRPr lang="fr-CA"/>
           </a:p>
         </p:txBody>
@@ -2733,6 +2922,9 @@
             </a:lvl1pPr>
           </a:lstStyle>
           <a:p>
+            <a:pPr>
+              <a:defRPr/>
+            </a:pPr>
             <a:endParaRPr lang="fr-CA"/>
           </a:p>
         </p:txBody>
@@ -2776,9 +2968,14 @@
             </a:lvl1pPr>
           </a:lstStyle>
           <a:p>
-            <a:fld id="{199E6E26-FB15-4569-9039-CCCEFACCBD92}" type="slidenum">
+            <a:pPr>
+              <a:defRPr/>
+            </a:pPr>
+            <a:fld id="{5E1B1982-B1E6-4EBC-AF60-809E2708D7CC}" type="slidenum">
               <a:rPr lang="fr-CA"/>
-              <a:pPr/>
+              <a:pPr>
+                <a:defRPr/>
+              </a:pPr>
               <a:t>‹#›</a:t>
             </a:fld>
             <a:endParaRPr lang="fr-CA"/>
@@ -2789,21 +2986,21 @@
   </p:cSld>
   <p:clrMap bg1="lt1" tx1="dk1" bg2="lt2" tx2="dk2" accent1="accent1" accent2="accent2" accent3="accent3" accent4="accent4" accent5="accent5" accent6="accent6" hlink="hlink" folHlink="folHlink"/>
   <p:sldLayoutIdLst>
-    <p:sldLayoutId id="2147483649" r:id="rId1"/>
-    <p:sldLayoutId id="2147483650" r:id="rId2"/>
-    <p:sldLayoutId id="2147483651" r:id="rId3"/>
-    <p:sldLayoutId id="2147483652" r:id="rId4"/>
-    <p:sldLayoutId id="2147483653" r:id="rId5"/>
+    <p:sldLayoutId id="2147483659" r:id="rId1"/>
+    <p:sldLayoutId id="2147483658" r:id="rId2"/>
+    <p:sldLayoutId id="2147483657" r:id="rId3"/>
+    <p:sldLayoutId id="2147483656" r:id="rId4"/>
+    <p:sldLayoutId id="2147483655" r:id="rId5"/>
     <p:sldLayoutId id="2147483654" r:id="rId6"/>
-    <p:sldLayoutId id="2147483655" r:id="rId7"/>
-    <p:sldLayoutId id="2147483656" r:id="rId8"/>
-    <p:sldLayoutId id="2147483657" r:id="rId9"/>
-    <p:sldLayoutId id="2147483658" r:id="rId10"/>
-    <p:sldLayoutId id="2147483659" r:id="rId11"/>
+    <p:sldLayoutId id="2147483653" r:id="rId7"/>
+    <p:sldLayoutId id="2147483652" r:id="rId8"/>
+    <p:sldLayoutId id="2147483651" r:id="rId9"/>
+    <p:sldLayoutId id="2147483650" r:id="rId10"/>
+    <p:sldLayoutId id="2147483649" r:id="rId11"/>
   </p:sldLayoutIdLst>
   <p:txStyles>
     <p:titleStyle>
-      <a:lvl1pPr algn="ctr" rtl="0" fontAlgn="base">
+      <a:lvl1pPr algn="ctr" rtl="0" eaLnBrk="0" fontAlgn="base" hangingPunct="0">
         <a:spcBef>
           <a:spcPct val="0"/>
         </a:spcBef>
@@ -2819,7 +3016,7 @@
           <a:cs typeface="+mj-cs"/>
         </a:defRPr>
       </a:lvl1pPr>
-      <a:lvl2pPr algn="ctr" rtl="0" fontAlgn="base">
+      <a:lvl2pPr algn="ctr" rtl="0" eaLnBrk="0" fontAlgn="base" hangingPunct="0">
         <a:spcBef>
           <a:spcPct val="0"/>
         </a:spcBef>
@@ -2834,7 +3031,7 @@
           <a:cs typeface="Arial" charset="0"/>
         </a:defRPr>
       </a:lvl2pPr>
-      <a:lvl3pPr algn="ctr" rtl="0" fontAlgn="base">
+      <a:lvl3pPr algn="ctr" rtl="0" eaLnBrk="0" fontAlgn="base" hangingPunct="0">
         <a:spcBef>
           <a:spcPct val="0"/>
         </a:spcBef>
@@ -2849,7 +3046,7 @@
           <a:cs typeface="Arial" charset="0"/>
         </a:defRPr>
       </a:lvl3pPr>
-      <a:lvl4pPr algn="ctr" rtl="0" fontAlgn="base">
+      <a:lvl4pPr algn="ctr" rtl="0" eaLnBrk="0" fontAlgn="base" hangingPunct="0">
         <a:spcBef>
           <a:spcPct val="0"/>
         </a:spcBef>
@@ -2864,7 +3061,7 @@
           <a:cs typeface="Arial" charset="0"/>
         </a:defRPr>
       </a:lvl4pPr>
-      <a:lvl5pPr algn="ctr" rtl="0" fontAlgn="base">
+      <a:lvl5pPr algn="ctr" rtl="0" eaLnBrk="0" fontAlgn="base" hangingPunct="0">
         <a:spcBef>
           <a:spcPct val="0"/>
         </a:spcBef>
@@ -2941,7 +3138,7 @@
       </a:lvl9pPr>
     </p:titleStyle>
     <p:bodyStyle>
-      <a:lvl1pPr marL="342900" indent="-342900" algn="l" rtl="0" fontAlgn="base">
+      <a:lvl1pPr marL="342900" indent="-342900" algn="l" rtl="0" eaLnBrk="0" fontAlgn="base" hangingPunct="0">
         <a:spcBef>
           <a:spcPct val="20000"/>
         </a:spcBef>
@@ -2958,7 +3155,7 @@
           <a:cs typeface="+mn-cs"/>
         </a:defRPr>
       </a:lvl1pPr>
-      <a:lvl2pPr marL="742950" indent="-285750" algn="l" rtl="0" fontAlgn="base">
+      <a:lvl2pPr marL="742950" indent="-285750" algn="l" rtl="0" eaLnBrk="0" fontAlgn="base" hangingPunct="0">
         <a:spcBef>
           <a:spcPct val="20000"/>
         </a:spcBef>
@@ -2974,7 +3171,7 @@
           <a:cs typeface="+mn-cs"/>
         </a:defRPr>
       </a:lvl2pPr>
-      <a:lvl3pPr marL="1143000" indent="-228600" algn="l" rtl="0" fontAlgn="base">
+      <a:lvl3pPr marL="1143000" indent="-228600" algn="l" rtl="0" eaLnBrk="0" fontAlgn="base" hangingPunct="0">
         <a:spcBef>
           <a:spcPct val="20000"/>
         </a:spcBef>
@@ -2990,7 +3187,7 @@
           <a:cs typeface="+mn-cs"/>
         </a:defRPr>
       </a:lvl3pPr>
-      <a:lvl4pPr marL="1600200" indent="-228600" algn="l" rtl="0" fontAlgn="base">
+      <a:lvl4pPr marL="1600200" indent="-228600" algn="l" rtl="0" eaLnBrk="0" fontAlgn="base" hangingPunct="0">
         <a:spcBef>
           <a:spcPct val="20000"/>
         </a:spcBef>
@@ -3006,7 +3203,7 @@
           <a:cs typeface="+mn-cs"/>
         </a:defRPr>
       </a:lvl4pPr>
-      <a:lvl5pPr marL="2057400" indent="-228600" algn="l" rtl="0" fontAlgn="base">
+      <a:lvl5pPr marL="2057400" indent="-228600" algn="l" rtl="0" eaLnBrk="0" fontAlgn="base" hangingPunct="0">
         <a:spcBef>
           <a:spcPct val="20000"/>
         </a:spcBef>

</xml_diff>